<commit_message>
time record + record cheat
</commit_message>
<xml_diff>
--- a/art/LOGO 4.pptx
+++ b/art/LOGO 4.pptx
@@ -261,7 +261,7 @@
           <a:p>
             <a:fld id="{24191A7E-2728-45C9-BF1A-3CA8E391AEBD}" type="datetimeFigureOut">
               <a:rPr lang="he-IL" smtClean="0"/>
-              <a:t>ט"ז/ניסן/תשפ"ב</a:t>
+              <a:t>י"ז/ניסן/תשפ"ב</a:t>
             </a:fld>
             <a:endParaRPr lang="he-IL"/>
           </a:p>
@@ -461,7 +461,7 @@
           <a:p>
             <a:fld id="{24191A7E-2728-45C9-BF1A-3CA8E391AEBD}" type="datetimeFigureOut">
               <a:rPr lang="he-IL" smtClean="0"/>
-              <a:t>ט"ז/ניסן/תשפ"ב</a:t>
+              <a:t>י"ז/ניסן/תשפ"ב</a:t>
             </a:fld>
             <a:endParaRPr lang="he-IL"/>
           </a:p>
@@ -671,7 +671,7 @@
           <a:p>
             <a:fld id="{24191A7E-2728-45C9-BF1A-3CA8E391AEBD}" type="datetimeFigureOut">
               <a:rPr lang="he-IL" smtClean="0"/>
-              <a:t>ט"ז/ניסן/תשפ"ב</a:t>
+              <a:t>י"ז/ניסן/תשפ"ב</a:t>
             </a:fld>
             <a:endParaRPr lang="he-IL"/>
           </a:p>
@@ -871,7 +871,7 @@
           <a:p>
             <a:fld id="{24191A7E-2728-45C9-BF1A-3CA8E391AEBD}" type="datetimeFigureOut">
               <a:rPr lang="he-IL" smtClean="0"/>
-              <a:t>ט"ז/ניסן/תשפ"ב</a:t>
+              <a:t>י"ז/ניסן/תשפ"ב</a:t>
             </a:fld>
             <a:endParaRPr lang="he-IL"/>
           </a:p>
@@ -1147,7 +1147,7 @@
           <a:p>
             <a:fld id="{24191A7E-2728-45C9-BF1A-3CA8E391AEBD}" type="datetimeFigureOut">
               <a:rPr lang="he-IL" smtClean="0"/>
-              <a:t>ט"ז/ניסן/תשפ"ב</a:t>
+              <a:t>י"ז/ניסן/תשפ"ב</a:t>
             </a:fld>
             <a:endParaRPr lang="he-IL"/>
           </a:p>
@@ -1415,7 +1415,7 @@
           <a:p>
             <a:fld id="{24191A7E-2728-45C9-BF1A-3CA8E391AEBD}" type="datetimeFigureOut">
               <a:rPr lang="he-IL" smtClean="0"/>
-              <a:t>ט"ז/ניסן/תשפ"ב</a:t>
+              <a:t>י"ז/ניסן/תשפ"ב</a:t>
             </a:fld>
             <a:endParaRPr lang="he-IL"/>
           </a:p>
@@ -1830,7 +1830,7 @@
           <a:p>
             <a:fld id="{24191A7E-2728-45C9-BF1A-3CA8E391AEBD}" type="datetimeFigureOut">
               <a:rPr lang="he-IL" smtClean="0"/>
-              <a:t>ט"ז/ניסן/תשפ"ב</a:t>
+              <a:t>י"ז/ניסן/תשפ"ב</a:t>
             </a:fld>
             <a:endParaRPr lang="he-IL"/>
           </a:p>
@@ -1972,7 +1972,7 @@
           <a:p>
             <a:fld id="{24191A7E-2728-45C9-BF1A-3CA8E391AEBD}" type="datetimeFigureOut">
               <a:rPr lang="he-IL" smtClean="0"/>
-              <a:t>ט"ז/ניסן/תשפ"ב</a:t>
+              <a:t>י"ז/ניסן/תשפ"ב</a:t>
             </a:fld>
             <a:endParaRPr lang="he-IL"/>
           </a:p>
@@ -2085,7 +2085,7 @@
           <a:p>
             <a:fld id="{24191A7E-2728-45C9-BF1A-3CA8E391AEBD}" type="datetimeFigureOut">
               <a:rPr lang="he-IL" smtClean="0"/>
-              <a:t>ט"ז/ניסן/תשפ"ב</a:t>
+              <a:t>י"ז/ניסן/תשפ"ב</a:t>
             </a:fld>
             <a:endParaRPr lang="he-IL"/>
           </a:p>
@@ -2398,7 +2398,7 @@
           <a:p>
             <a:fld id="{24191A7E-2728-45C9-BF1A-3CA8E391AEBD}" type="datetimeFigureOut">
               <a:rPr lang="he-IL" smtClean="0"/>
-              <a:t>ט"ז/ניסן/תשפ"ב</a:t>
+              <a:t>י"ז/ניסן/תשפ"ב</a:t>
             </a:fld>
             <a:endParaRPr lang="he-IL"/>
           </a:p>
@@ -2687,7 +2687,7 @@
           <a:p>
             <a:fld id="{24191A7E-2728-45C9-BF1A-3CA8E391AEBD}" type="datetimeFigureOut">
               <a:rPr lang="he-IL" smtClean="0"/>
-              <a:t>ט"ז/ניסן/תשפ"ב</a:t>
+              <a:t>י"ז/ניסן/תשפ"ב</a:t>
             </a:fld>
             <a:endParaRPr lang="he-IL"/>
           </a:p>
@@ -2930,7 +2930,7 @@
           <a:p>
             <a:fld id="{24191A7E-2728-45C9-BF1A-3CA8E391AEBD}" type="datetimeFigureOut">
               <a:rPr lang="he-IL" smtClean="0"/>
-              <a:t>ט"ז/ניסן/תשפ"ב</a:t>
+              <a:t>י"ז/ניסן/תשפ"ב</a:t>
             </a:fld>
             <a:endParaRPr lang="he-IL"/>
           </a:p>
@@ -3472,7 +3472,7 @@
             <a:avLst/>
           </a:prstGeom>
           <a:solidFill>
-            <a:srgbClr val="A47DC5"/>
+            <a:srgbClr val="805C9C"/>
           </a:solidFill>
           <a:ln>
             <a:noFill/>

</xml_diff>